<commit_message>
no major changes here afaik
</commit_message>
<xml_diff>
--- a/Slides/Schools Snapshot/NoExamModules_InvestigationGraphs.pptx
+++ b/Slides/Schools Snapshot/NoExamModules_InvestigationGraphs.pptx
@@ -111,6 +111,11 @@
       </a:defRPr>
     </a:lvl9pPr>
   </p:defaultTextStyle>
+  <p:extLst>
+    <p:ext uri="{EFAFB233-063F-42B5-8137-9DF3F51BA10A}">
+      <p15:sldGuideLst xmlns:p15="http://schemas.microsoft.com/office/powerpoint/2012/main"/>
+    </p:ext>
+  </p:extLst>
 </p:presentation>
 </file>
 
@@ -263,7 +268,7 @@
           <a:p>
             <a:fld id="{7E55686E-1E90-4D65-AEB8-2272F63E3068}" type="datetimeFigureOut">
               <a:rPr lang="en-GB" smtClean="0"/>
-              <a:t>19/07/2023</a:t>
+              <a:t>24/07/2023</a:t>
             </a:fld>
             <a:endParaRPr lang="en-GB"/>
           </a:p>
@@ -463,7 +468,7 @@
           <a:p>
             <a:fld id="{7E55686E-1E90-4D65-AEB8-2272F63E3068}" type="datetimeFigureOut">
               <a:rPr lang="en-GB" smtClean="0"/>
-              <a:t>19/07/2023</a:t>
+              <a:t>24/07/2023</a:t>
             </a:fld>
             <a:endParaRPr lang="en-GB"/>
           </a:p>
@@ -673,7 +678,7 @@
           <a:p>
             <a:fld id="{7E55686E-1E90-4D65-AEB8-2272F63E3068}" type="datetimeFigureOut">
               <a:rPr lang="en-GB" smtClean="0"/>
-              <a:t>19/07/2023</a:t>
+              <a:t>24/07/2023</a:t>
             </a:fld>
             <a:endParaRPr lang="en-GB"/>
           </a:p>
@@ -873,7 +878,7 @@
           <a:p>
             <a:fld id="{7E55686E-1E90-4D65-AEB8-2272F63E3068}" type="datetimeFigureOut">
               <a:rPr lang="en-GB" smtClean="0"/>
-              <a:t>19/07/2023</a:t>
+              <a:t>24/07/2023</a:t>
             </a:fld>
             <a:endParaRPr lang="en-GB"/>
           </a:p>
@@ -1149,7 +1154,7 @@
           <a:p>
             <a:fld id="{7E55686E-1E90-4D65-AEB8-2272F63E3068}" type="datetimeFigureOut">
               <a:rPr lang="en-GB" smtClean="0"/>
-              <a:t>19/07/2023</a:t>
+              <a:t>24/07/2023</a:t>
             </a:fld>
             <a:endParaRPr lang="en-GB"/>
           </a:p>
@@ -1417,7 +1422,7 @@
           <a:p>
             <a:fld id="{7E55686E-1E90-4D65-AEB8-2272F63E3068}" type="datetimeFigureOut">
               <a:rPr lang="en-GB" smtClean="0"/>
-              <a:t>19/07/2023</a:t>
+              <a:t>24/07/2023</a:t>
             </a:fld>
             <a:endParaRPr lang="en-GB"/>
           </a:p>
@@ -1832,7 +1837,7 @@
           <a:p>
             <a:fld id="{7E55686E-1E90-4D65-AEB8-2272F63E3068}" type="datetimeFigureOut">
               <a:rPr lang="en-GB" smtClean="0"/>
-              <a:t>19/07/2023</a:t>
+              <a:t>24/07/2023</a:t>
             </a:fld>
             <a:endParaRPr lang="en-GB"/>
           </a:p>
@@ -1974,7 +1979,7 @@
           <a:p>
             <a:fld id="{7E55686E-1E90-4D65-AEB8-2272F63E3068}" type="datetimeFigureOut">
               <a:rPr lang="en-GB" smtClean="0"/>
-              <a:t>19/07/2023</a:t>
+              <a:t>24/07/2023</a:t>
             </a:fld>
             <a:endParaRPr lang="en-GB"/>
           </a:p>
@@ -2087,7 +2092,7 @@
           <a:p>
             <a:fld id="{7E55686E-1E90-4D65-AEB8-2272F63E3068}" type="datetimeFigureOut">
               <a:rPr lang="en-GB" smtClean="0"/>
-              <a:t>19/07/2023</a:t>
+              <a:t>24/07/2023</a:t>
             </a:fld>
             <a:endParaRPr lang="en-GB"/>
           </a:p>
@@ -2400,7 +2405,7 @@
           <a:p>
             <a:fld id="{7E55686E-1E90-4D65-AEB8-2272F63E3068}" type="datetimeFigureOut">
               <a:rPr lang="en-GB" smtClean="0"/>
-              <a:t>19/07/2023</a:t>
+              <a:t>24/07/2023</a:t>
             </a:fld>
             <a:endParaRPr lang="en-GB"/>
           </a:p>
@@ -2689,7 +2694,7 @@
           <a:p>
             <a:fld id="{7E55686E-1E90-4D65-AEB8-2272F63E3068}" type="datetimeFigureOut">
               <a:rPr lang="en-GB" smtClean="0"/>
-              <a:t>19/07/2023</a:t>
+              <a:t>24/07/2023</a:t>
             </a:fld>
             <a:endParaRPr lang="en-GB"/>
           </a:p>
@@ -2932,7 +2937,7 @@
           <a:p>
             <a:fld id="{7E55686E-1E90-4D65-AEB8-2272F63E3068}" type="datetimeFigureOut">
               <a:rPr lang="en-GB" smtClean="0"/>
-              <a:t>19/07/2023</a:t>
+              <a:t>24/07/2023</a:t>
             </a:fld>
             <a:endParaRPr lang="en-GB"/>
           </a:p>
@@ -3364,7 +3369,7 @@
         <p:spPr>
           <a:xfrm>
             <a:off x="331693" y="242047"/>
-            <a:ext cx="10165977" cy="2862322"/>
+            <a:ext cx="10165977" cy="4801314"/>
           </a:xfrm>
           <a:prstGeom prst="rect">
             <a:avLst/>
@@ -3467,6 +3472,80 @@
                 <a:latin typeface="Lato" panose="020F0502020204030203" pitchFamily="34" charset="0"/>
               </a:rPr>
               <a:t>CBE: 24</a:t>
+            </a:r>
+          </a:p>
+          <a:p>
+            <a:pPr marL="285750" indent="-285750">
+              <a:buFontTx/>
+              <a:buChar char="-"/>
+            </a:pPr>
+            <a:endParaRPr lang="en-GB" dirty="0">
+              <a:latin typeface="Lato" panose="020F0502020204030203" pitchFamily="34" charset="0"/>
+            </a:endParaRPr>
+          </a:p>
+          <a:p>
+            <a:r>
+              <a:rPr lang="en-GB" dirty="0">
+                <a:latin typeface="Lato" panose="020F0502020204030203" pitchFamily="34" charset="0"/>
+              </a:rPr>
+              <a:t>The following breakdown of modules excludes:</a:t>
+            </a:r>
+          </a:p>
+          <a:p>
+            <a:pPr marL="285750" indent="-285750">
+              <a:buFontTx/>
+              <a:buChar char="-"/>
+            </a:pPr>
+            <a:r>
+              <a:rPr lang="en-GB" dirty="0">
+                <a:latin typeface="Lato" panose="020F0502020204030203" pitchFamily="34" charset="0"/>
+              </a:rPr>
+              <a:t>Modules worth at least </a:t>
+            </a:r>
+            <a:r>
+              <a:rPr lang="en-GB">
+                <a:latin typeface="Lato" panose="020F0502020204030203" pitchFamily="34" charset="0"/>
+              </a:rPr>
+              <a:t>20 credits.</a:t>
+            </a:r>
+            <a:endParaRPr lang="en-GB" dirty="0">
+              <a:latin typeface="Lato" panose="020F0502020204030203" pitchFamily="34" charset="0"/>
+            </a:endParaRPr>
+          </a:p>
+          <a:p>
+            <a:pPr marL="285750" indent="-285750">
+              <a:buFontTx/>
+              <a:buChar char="-"/>
+            </a:pPr>
+            <a:r>
+              <a:rPr lang="en-GB" dirty="0">
+                <a:latin typeface="Lato" panose="020F0502020204030203" pitchFamily="34" charset="0"/>
+              </a:rPr>
+              <a:t>Modules that have been identified as thesis/dissertation/research project modules.</a:t>
+            </a:r>
+          </a:p>
+          <a:p>
+            <a:pPr marL="285750" indent="-285750">
+              <a:buFontTx/>
+              <a:buChar char="-"/>
+            </a:pPr>
+            <a:r>
+              <a:rPr lang="en-GB" dirty="0">
+                <a:latin typeface="Lato" panose="020F0502020204030203" pitchFamily="34" charset="0"/>
+              </a:rPr>
+              <a:t>Work placement modules.</a:t>
+            </a:r>
+          </a:p>
+          <a:p>
+            <a:pPr marL="285750" indent="-285750">
+              <a:buFontTx/>
+              <a:buChar char="-"/>
+            </a:pPr>
+            <a:r>
+              <a:rPr lang="en-GB" dirty="0">
+                <a:latin typeface="Lato" panose="020F0502020204030203" pitchFamily="34" charset="0"/>
+              </a:rPr>
+              <a:t>Modules that have a non-zero weighting on “Examination”, “Studio Examination”, “Oral Examination” or “Practical Examination” components.</a:t>
             </a:r>
           </a:p>
         </p:txBody>

</xml_diff>